<commit_message>
Update Logic Sequence Diagram
</commit_message>
<xml_diff>
--- a/docs/diagrams/LogicComponentSequenceDiagram.pptx
+++ b/docs/diagrams/LogicComponentSequenceDiagram.pptx
@@ -208,7 +208,7 @@
           <a:p>
             <a:fld id="{F5CC4B3F-88C1-4FFA-B1B6-F41C21DC6924}" type="datetimeFigureOut">
               <a:rPr lang="en-US" smtClean="0"/>
-              <a:t>2/6/2017</a:t>
+              <a:t>3/16/17</a:t>
             </a:fld>
             <a:endParaRPr lang="en-US"/>
           </a:p>
@@ -657,7 +657,7 @@
           <a:p>
             <a:fld id="{78C97017-6FC3-485B-9764-EAC9E56C1D49}" type="datetimeFigureOut">
               <a:rPr lang="en-US" smtClean="0"/>
-              <a:t>2/6/2017</a:t>
+              <a:t>3/16/17</a:t>
             </a:fld>
             <a:endParaRPr lang="en-US"/>
           </a:p>
@@ -827,7 +827,7 @@
           <a:p>
             <a:fld id="{78C97017-6FC3-485B-9764-EAC9E56C1D49}" type="datetimeFigureOut">
               <a:rPr lang="en-US" smtClean="0"/>
-              <a:t>2/6/2017</a:t>
+              <a:t>3/16/17</a:t>
             </a:fld>
             <a:endParaRPr lang="en-US"/>
           </a:p>
@@ -1007,7 +1007,7 @@
           <a:p>
             <a:fld id="{78C97017-6FC3-485B-9764-EAC9E56C1D49}" type="datetimeFigureOut">
               <a:rPr lang="en-US" smtClean="0"/>
-              <a:t>2/6/2017</a:t>
+              <a:t>3/16/17</a:t>
             </a:fld>
             <a:endParaRPr lang="en-US"/>
           </a:p>
@@ -1177,7 +1177,7 @@
           <a:p>
             <a:fld id="{78C97017-6FC3-485B-9764-EAC9E56C1D49}" type="datetimeFigureOut">
               <a:rPr lang="en-US" smtClean="0"/>
-              <a:t>2/6/2017</a:t>
+              <a:t>3/16/17</a:t>
             </a:fld>
             <a:endParaRPr lang="en-US"/>
           </a:p>
@@ -1423,7 +1423,7 @@
           <a:p>
             <a:fld id="{78C97017-6FC3-485B-9764-EAC9E56C1D49}" type="datetimeFigureOut">
               <a:rPr lang="en-US" smtClean="0"/>
-              <a:t>2/6/2017</a:t>
+              <a:t>3/16/17</a:t>
             </a:fld>
             <a:endParaRPr lang="en-US"/>
           </a:p>
@@ -1711,7 +1711,7 @@
           <a:p>
             <a:fld id="{78C97017-6FC3-485B-9764-EAC9E56C1D49}" type="datetimeFigureOut">
               <a:rPr lang="en-US" smtClean="0"/>
-              <a:t>2/6/2017</a:t>
+              <a:t>3/16/17</a:t>
             </a:fld>
             <a:endParaRPr lang="en-US"/>
           </a:p>
@@ -2133,7 +2133,7 @@
           <a:p>
             <a:fld id="{78C97017-6FC3-485B-9764-EAC9E56C1D49}" type="datetimeFigureOut">
               <a:rPr lang="en-US" smtClean="0"/>
-              <a:t>2/6/2017</a:t>
+              <a:t>3/16/17</a:t>
             </a:fld>
             <a:endParaRPr lang="en-US"/>
           </a:p>
@@ -2251,7 +2251,7 @@
           <a:p>
             <a:fld id="{78C97017-6FC3-485B-9764-EAC9E56C1D49}" type="datetimeFigureOut">
               <a:rPr lang="en-US" smtClean="0"/>
-              <a:t>2/6/2017</a:t>
+              <a:t>3/16/17</a:t>
             </a:fld>
             <a:endParaRPr lang="en-US"/>
           </a:p>
@@ -2346,7 +2346,7 @@
           <a:p>
             <a:fld id="{78C97017-6FC3-485B-9764-EAC9E56C1D49}" type="datetimeFigureOut">
               <a:rPr lang="en-US" smtClean="0"/>
-              <a:t>2/6/2017</a:t>
+              <a:t>3/16/17</a:t>
             </a:fld>
             <a:endParaRPr lang="en-US"/>
           </a:p>
@@ -2623,7 +2623,7 @@
           <a:p>
             <a:fld id="{78C97017-6FC3-485B-9764-EAC9E56C1D49}" type="datetimeFigureOut">
               <a:rPr lang="en-US" smtClean="0"/>
-              <a:t>2/6/2017</a:t>
+              <a:t>3/16/17</a:t>
             </a:fld>
             <a:endParaRPr lang="en-US"/>
           </a:p>
@@ -2876,7 +2876,7 @@
           <a:p>
             <a:fld id="{78C97017-6FC3-485B-9764-EAC9E56C1D49}" type="datetimeFigureOut">
               <a:rPr lang="en-US" smtClean="0"/>
-              <a:t>2/6/2017</a:t>
+              <a:t>3/16/17</a:t>
             </a:fld>
             <a:endParaRPr lang="en-US"/>
           </a:p>
@@ -3089,7 +3089,7 @@
           <a:p>
             <a:fld id="{78C97017-6FC3-485B-9764-EAC9E56C1D49}" type="datetimeFigureOut">
               <a:rPr lang="en-US" smtClean="0"/>
-              <a:t>2/6/2017</a:t>
+              <a:t>3/16/17</a:t>
             </a:fld>
             <a:endParaRPr lang="en-US"/>
           </a:p>
@@ -3574,15 +3574,7 @@
                   <a:schemeClr val="bg1"/>
                 </a:solidFill>
               </a:rPr>
-              <a:t>:</a:t>
-            </a:r>
-            <a:r>
-              <a:rPr lang="en-US" sz="1600" dirty="0" err="1">
-                <a:solidFill>
-                  <a:schemeClr val="bg1"/>
-                </a:solidFill>
-              </a:rPr>
-              <a:t>LogicManager</a:t>
+              <a:t>:LogicManager</a:t>
             </a:r>
             <a:endParaRPr lang="en-SG" sz="1600" dirty="0">
               <a:solidFill>
@@ -4686,20 +4678,20 @@
           </a:lstStyle>
           <a:p>
             <a:r>
-              <a:rPr lang="en-US" dirty="0" err="1" smtClean="0">
-                <a:solidFill>
-                  <a:srgbClr val="7030A0"/>
-                </a:solidFill>
-              </a:rPr>
-              <a:t>deletePerson</a:t>
-            </a:r>
-            <a:r>
               <a:rPr lang="en-US" dirty="0" smtClean="0">
                 <a:solidFill>
                   <a:srgbClr val="7030A0"/>
                 </a:solidFill>
               </a:rPr>
-              <a:t>(p)</a:t>
+              <a:t>deleteTask(p</a:t>
+            </a:r>
+            <a:r>
+              <a:rPr lang="en-US" dirty="0" smtClean="0">
+                <a:solidFill>
+                  <a:srgbClr val="7030A0"/>
+                </a:solidFill>
+              </a:rPr>
+              <a:t>)</a:t>
             </a:r>
             <a:endParaRPr lang="en-US" dirty="0">
               <a:solidFill>
@@ -4921,20 +4913,12 @@
           <a:p>
             <a:pPr algn="ctr"/>
             <a:r>
-              <a:rPr lang="en-US" sz="1600" dirty="0" err="1" smtClean="0">
-                <a:solidFill>
-                  <a:schemeClr val="bg1"/>
-                </a:solidFill>
-              </a:rPr>
-              <a:t>result:Command</a:t>
-            </a:r>
-            <a:r>
               <a:rPr lang="en-US" sz="1600" dirty="0" smtClean="0">
                 <a:solidFill>
                   <a:schemeClr val="bg1"/>
                 </a:solidFill>
               </a:rPr>
-              <a:t> Result</a:t>
+              <a:t>result:Command Result</a:t>
             </a:r>
             <a:endParaRPr lang="en-SG" sz="1600" dirty="0">
               <a:solidFill>
@@ -5119,21 +5103,8 @@
                   <a:schemeClr val="bg1"/>
                 </a:solidFill>
               </a:rPr>
-              <a:t>:</a:t>
-            </a:r>
-            <a:r>
-              <a:rPr lang="en-US" sz="1600" dirty="0" err="1" smtClean="0">
-                <a:solidFill>
-                  <a:schemeClr val="bg1"/>
-                </a:solidFill>
-              </a:rPr>
-              <a:t>DeleteCommand</a:t>
-            </a:r>
-            <a:endParaRPr lang="en-US" sz="1600" dirty="0" smtClean="0">
-              <a:solidFill>
-                <a:schemeClr val="bg1"/>
-              </a:solidFill>
-            </a:endParaRPr>
+              <a:t>:DeleteCommand</a:t>
+            </a:r>
           </a:p>
           <a:p>
             <a:pPr algn="ctr"/>

</xml_diff>

<commit_message>
Added new image for Logic component sequence diagram
</commit_message>
<xml_diff>
--- a/docs/diagrams/LogicComponentSequenceDiagram.pptx
+++ b/docs/diagrams/LogicComponentSequenceDiagram.pptx
@@ -3472,8 +3472,8 @@
         </p:nvSpPr>
         <p:spPr>
           <a:xfrm>
-            <a:off x="0" y="1981200"/>
-            <a:ext cx="8723097" cy="4191000"/>
+            <a:off x="-14031" y="2020657"/>
+            <a:ext cx="9158031" cy="4191000"/>
           </a:xfrm>
           <a:prstGeom prst="roundRect">
             <a:avLst>
@@ -4699,15 +4699,7 @@
                   <a:srgbClr val="7030A0"/>
                 </a:solidFill>
               </a:rPr>
-              <a:t>(p</a:t>
-            </a:r>
-            <a:r>
-              <a:rPr lang="en-US" dirty="0" smtClean="0">
-                <a:solidFill>
-                  <a:srgbClr val="7030A0"/>
-                </a:solidFill>
-              </a:rPr>
-              <a:t>)</a:t>
+              <a:t>(p)</a:t>
             </a:r>
             <a:endParaRPr lang="en-US" dirty="0">
               <a:solidFill>

</xml_diff>

<commit_message>
update logic component logic sequence diagram
</commit_message>
<xml_diff>
--- a/docs/diagrams/LogicComponentSequenceDiagram.pptx
+++ b/docs/diagrams/LogicComponentSequenceDiagram.pptx
@@ -10,7 +10,7 @@
   <p:sldIdLst>
     <p:sldId id="267" r:id="rId2"/>
   </p:sldIdLst>
-  <p:sldSz cx="9144000" cy="6858000" type="screen4x3"/>
+  <p:sldSz cx="12192000" cy="6858000"/>
   <p:notesSz cx="6858000" cy="9144000"/>
   <p:defaultTextStyle>
     <a:defPPr>
@@ -110,12 +110,12 @@
   <p:extLst>
     <p:ext uri="{EFAFB233-063F-42B5-8137-9DF3F51BA10A}">
       <p15:sldGuideLst xmlns:p15="http://schemas.microsoft.com/office/powerpoint/2012/main">
-        <p15:guide id="1" orient="horz" pos="1488">
+        <p15:guide id="1" orient="horz" pos="1488" userDrawn="1">
           <p15:clr>
             <a:srgbClr val="A4A3A4"/>
           </p15:clr>
         </p15:guide>
-        <p15:guide id="2" pos="2880">
+        <p15:guide id="2" pos="3840" userDrawn="1">
           <p15:clr>
             <a:srgbClr val="A4A3A4"/>
           </p15:clr>
@@ -208,7 +208,7 @@
           <a:p>
             <a:fld id="{F5CC4B3F-88C1-4FFA-B1B6-F41C21DC6924}" type="datetimeFigureOut">
               <a:rPr lang="en-US" smtClean="0"/>
-              <a:t>2/6/2017</a:t>
+              <a:t>3/23/2017</a:t>
             </a:fld>
             <a:endParaRPr lang="en-US"/>
           </a:p>
@@ -226,8 +226,8 @@
         </p:nvSpPr>
         <p:spPr>
           <a:xfrm>
-            <a:off x="1143000" y="685800"/>
-            <a:ext cx="4572000" cy="3429000"/>
+            <a:off x="381000" y="685800"/>
+            <a:ext cx="6096000" cy="3429000"/>
           </a:xfrm>
           <a:prstGeom prst="rect">
             <a:avLst/>
@@ -505,8 +505,8 @@
         </p:nvSpPr>
         <p:spPr>
           <a:xfrm>
-            <a:off x="685800" y="2130425"/>
-            <a:ext cx="7772400" cy="1470025"/>
+            <a:off x="914400" y="2130426"/>
+            <a:ext cx="10363200" cy="1470025"/>
           </a:xfrm>
         </p:spPr>
         <p:txBody>
@@ -533,8 +533,8 @@
         </p:nvSpPr>
         <p:spPr>
           <a:xfrm>
-            <a:off x="1371600" y="3886200"/>
-            <a:ext cx="6400800" cy="1752600"/>
+            <a:off x="1828800" y="3886200"/>
+            <a:ext cx="8534400" cy="1752600"/>
           </a:xfrm>
         </p:spPr>
         <p:txBody>
@@ -657,7 +657,7 @@
           <a:p>
             <a:fld id="{78C97017-6FC3-485B-9764-EAC9E56C1D49}" type="datetimeFigureOut">
               <a:rPr lang="en-US" smtClean="0"/>
-              <a:t>2/6/2017</a:t>
+              <a:t>3/23/2017</a:t>
             </a:fld>
             <a:endParaRPr lang="en-US"/>
           </a:p>
@@ -827,7 +827,7 @@
           <a:p>
             <a:fld id="{78C97017-6FC3-485B-9764-EAC9E56C1D49}" type="datetimeFigureOut">
               <a:rPr lang="en-US" smtClean="0"/>
-              <a:t>2/6/2017</a:t>
+              <a:t>3/23/2017</a:t>
             </a:fld>
             <a:endParaRPr lang="en-US"/>
           </a:p>
@@ -917,8 +917,8 @@
         </p:nvSpPr>
         <p:spPr>
           <a:xfrm>
-            <a:off x="6629400" y="274638"/>
-            <a:ext cx="2057400" cy="5851525"/>
+            <a:off x="8839200" y="274639"/>
+            <a:ext cx="2743200" cy="5851525"/>
           </a:xfrm>
         </p:spPr>
         <p:txBody>
@@ -945,8 +945,8 @@
         </p:nvSpPr>
         <p:spPr>
           <a:xfrm>
-            <a:off x="457200" y="274638"/>
-            <a:ext cx="6019800" cy="5851525"/>
+            <a:off x="609600" y="274639"/>
+            <a:ext cx="8026400" cy="5851525"/>
           </a:xfrm>
         </p:spPr>
         <p:txBody>
@@ -1007,7 +1007,7 @@
           <a:p>
             <a:fld id="{78C97017-6FC3-485B-9764-EAC9E56C1D49}" type="datetimeFigureOut">
               <a:rPr lang="en-US" smtClean="0"/>
-              <a:t>2/6/2017</a:t>
+              <a:t>3/23/2017</a:t>
             </a:fld>
             <a:endParaRPr lang="en-US"/>
           </a:p>
@@ -1177,7 +1177,7 @@
           <a:p>
             <a:fld id="{78C97017-6FC3-485B-9764-EAC9E56C1D49}" type="datetimeFigureOut">
               <a:rPr lang="en-US" smtClean="0"/>
-              <a:t>2/6/2017</a:t>
+              <a:t>3/23/2017</a:t>
             </a:fld>
             <a:endParaRPr lang="en-US"/>
           </a:p>
@@ -1267,8 +1267,8 @@
         </p:nvSpPr>
         <p:spPr>
           <a:xfrm>
-            <a:off x="722313" y="4406900"/>
-            <a:ext cx="7772400" cy="1362075"/>
+            <a:off x="963084" y="4406901"/>
+            <a:ext cx="10363200" cy="1362075"/>
           </a:xfrm>
         </p:spPr>
         <p:txBody>
@@ -1299,8 +1299,8 @@
         </p:nvSpPr>
         <p:spPr>
           <a:xfrm>
-            <a:off x="722313" y="2906713"/>
-            <a:ext cx="7772400" cy="1500187"/>
+            <a:off x="963084" y="2906713"/>
+            <a:ext cx="10363200" cy="1500187"/>
           </a:xfrm>
         </p:spPr>
         <p:txBody>
@@ -1423,7 +1423,7 @@
           <a:p>
             <a:fld id="{78C97017-6FC3-485B-9764-EAC9E56C1D49}" type="datetimeFigureOut">
               <a:rPr lang="en-US" smtClean="0"/>
-              <a:t>2/6/2017</a:t>
+              <a:t>3/23/2017</a:t>
             </a:fld>
             <a:endParaRPr lang="en-US"/>
           </a:p>
@@ -1536,8 +1536,8 @@
         </p:nvSpPr>
         <p:spPr>
           <a:xfrm>
-            <a:off x="457200" y="1600200"/>
-            <a:ext cx="4038600" cy="4525963"/>
+            <a:off x="609600" y="1600201"/>
+            <a:ext cx="5384800" cy="4525963"/>
           </a:xfrm>
         </p:spPr>
         <p:txBody>
@@ -1621,8 +1621,8 @@
         </p:nvSpPr>
         <p:spPr>
           <a:xfrm>
-            <a:off x="4648200" y="1600200"/>
-            <a:ext cx="4038600" cy="4525963"/>
+            <a:off x="6197600" y="1600201"/>
+            <a:ext cx="5384800" cy="4525963"/>
           </a:xfrm>
         </p:spPr>
         <p:txBody>
@@ -1711,7 +1711,7 @@
           <a:p>
             <a:fld id="{78C97017-6FC3-485B-9764-EAC9E56C1D49}" type="datetimeFigureOut">
               <a:rPr lang="en-US" smtClean="0"/>
-              <a:t>2/6/2017</a:t>
+              <a:t>3/23/2017</a:t>
             </a:fld>
             <a:endParaRPr lang="en-US"/>
           </a:p>
@@ -1828,8 +1828,8 @@
         </p:nvSpPr>
         <p:spPr>
           <a:xfrm>
-            <a:off x="457200" y="1535113"/>
-            <a:ext cx="4040188" cy="639762"/>
+            <a:off x="609600" y="1535113"/>
+            <a:ext cx="5386917" cy="639762"/>
           </a:xfrm>
         </p:spPr>
         <p:txBody>
@@ -1893,8 +1893,8 @@
         </p:nvSpPr>
         <p:spPr>
           <a:xfrm>
-            <a:off x="457200" y="2174875"/>
-            <a:ext cx="4040188" cy="3951288"/>
+            <a:off x="609600" y="2174875"/>
+            <a:ext cx="5386917" cy="3951288"/>
           </a:xfrm>
         </p:spPr>
         <p:txBody>
@@ -1978,8 +1978,8 @@
         </p:nvSpPr>
         <p:spPr>
           <a:xfrm>
-            <a:off x="4645025" y="1535113"/>
-            <a:ext cx="4041775" cy="639762"/>
+            <a:off x="6193368" y="1535113"/>
+            <a:ext cx="5389033" cy="639762"/>
           </a:xfrm>
         </p:spPr>
         <p:txBody>
@@ -2043,8 +2043,8 @@
         </p:nvSpPr>
         <p:spPr>
           <a:xfrm>
-            <a:off x="4645025" y="2174875"/>
-            <a:ext cx="4041775" cy="3951288"/>
+            <a:off x="6193368" y="2174875"/>
+            <a:ext cx="5389033" cy="3951288"/>
           </a:xfrm>
         </p:spPr>
         <p:txBody>
@@ -2133,7 +2133,7 @@
           <a:p>
             <a:fld id="{78C97017-6FC3-485B-9764-EAC9E56C1D49}" type="datetimeFigureOut">
               <a:rPr lang="en-US" smtClean="0"/>
-              <a:t>2/6/2017</a:t>
+              <a:t>3/23/2017</a:t>
             </a:fld>
             <a:endParaRPr lang="en-US"/>
           </a:p>
@@ -2251,7 +2251,7 @@
           <a:p>
             <a:fld id="{78C97017-6FC3-485B-9764-EAC9E56C1D49}" type="datetimeFigureOut">
               <a:rPr lang="en-US" smtClean="0"/>
-              <a:t>2/6/2017</a:t>
+              <a:t>3/23/2017</a:t>
             </a:fld>
             <a:endParaRPr lang="en-US"/>
           </a:p>
@@ -2346,7 +2346,7 @@
           <a:p>
             <a:fld id="{78C97017-6FC3-485B-9764-EAC9E56C1D49}" type="datetimeFigureOut">
               <a:rPr lang="en-US" smtClean="0"/>
-              <a:t>2/6/2017</a:t>
+              <a:t>3/23/2017</a:t>
             </a:fld>
             <a:endParaRPr lang="en-US"/>
           </a:p>
@@ -2436,8 +2436,8 @@
         </p:nvSpPr>
         <p:spPr>
           <a:xfrm>
-            <a:off x="457200" y="273050"/>
-            <a:ext cx="3008313" cy="1162050"/>
+            <a:off x="609601" y="273050"/>
+            <a:ext cx="4011084" cy="1162050"/>
           </a:xfrm>
         </p:spPr>
         <p:txBody>
@@ -2468,8 +2468,8 @@
         </p:nvSpPr>
         <p:spPr>
           <a:xfrm>
-            <a:off x="3575050" y="273050"/>
-            <a:ext cx="5111750" cy="5853113"/>
+            <a:off x="4766733" y="273051"/>
+            <a:ext cx="6815667" cy="5853113"/>
           </a:xfrm>
         </p:spPr>
         <p:txBody>
@@ -2553,8 +2553,8 @@
         </p:nvSpPr>
         <p:spPr>
           <a:xfrm>
-            <a:off x="457200" y="1435100"/>
-            <a:ext cx="3008313" cy="4691063"/>
+            <a:off x="609601" y="1435101"/>
+            <a:ext cx="4011084" cy="4691063"/>
           </a:xfrm>
         </p:spPr>
         <p:txBody>
@@ -2623,7 +2623,7 @@
           <a:p>
             <a:fld id="{78C97017-6FC3-485B-9764-EAC9E56C1D49}" type="datetimeFigureOut">
               <a:rPr lang="en-US" smtClean="0"/>
-              <a:t>2/6/2017</a:t>
+              <a:t>3/23/2017</a:t>
             </a:fld>
             <a:endParaRPr lang="en-US"/>
           </a:p>
@@ -2713,8 +2713,8 @@
         </p:nvSpPr>
         <p:spPr>
           <a:xfrm>
-            <a:off x="1792288" y="4800600"/>
-            <a:ext cx="5486400" cy="566738"/>
+            <a:off x="2389717" y="4800600"/>
+            <a:ext cx="7315200" cy="566738"/>
           </a:xfrm>
         </p:spPr>
         <p:txBody>
@@ -2745,8 +2745,8 @@
         </p:nvSpPr>
         <p:spPr>
           <a:xfrm>
-            <a:off x="1792288" y="612775"/>
-            <a:ext cx="5486400" cy="4114800"/>
+            <a:off x="2389717" y="612775"/>
+            <a:ext cx="7315200" cy="4114800"/>
           </a:xfrm>
         </p:spPr>
         <p:txBody>
@@ -2806,8 +2806,8 @@
         </p:nvSpPr>
         <p:spPr>
           <a:xfrm>
-            <a:off x="1792288" y="5367338"/>
-            <a:ext cx="5486400" cy="804862"/>
+            <a:off x="2389717" y="5367338"/>
+            <a:ext cx="7315200" cy="804862"/>
           </a:xfrm>
         </p:spPr>
         <p:txBody>
@@ -2876,7 +2876,7 @@
           <a:p>
             <a:fld id="{78C97017-6FC3-485B-9764-EAC9E56C1D49}" type="datetimeFigureOut">
               <a:rPr lang="en-US" smtClean="0"/>
-              <a:t>2/6/2017</a:t>
+              <a:t>3/23/2017</a:t>
             </a:fld>
             <a:endParaRPr lang="en-US"/>
           </a:p>
@@ -2971,8 +2971,8 @@
         </p:nvSpPr>
         <p:spPr>
           <a:xfrm>
-            <a:off x="457200" y="274638"/>
-            <a:ext cx="8229600" cy="1143000"/>
+            <a:off x="609600" y="274638"/>
+            <a:ext cx="10972800" cy="1143000"/>
           </a:xfrm>
           <a:prstGeom prst="rect">
             <a:avLst/>
@@ -3004,8 +3004,8 @@
         </p:nvSpPr>
         <p:spPr>
           <a:xfrm>
-            <a:off x="457200" y="1600200"/>
-            <a:ext cx="8229600" cy="4525963"/>
+            <a:off x="609600" y="1600201"/>
+            <a:ext cx="10972800" cy="4525963"/>
           </a:xfrm>
           <a:prstGeom prst="rect">
             <a:avLst/>
@@ -3066,8 +3066,8 @@
         </p:nvSpPr>
         <p:spPr>
           <a:xfrm>
-            <a:off x="457200" y="6356350"/>
-            <a:ext cx="2133600" cy="365125"/>
+            <a:off x="609600" y="6356351"/>
+            <a:ext cx="2844800" cy="365125"/>
           </a:xfrm>
           <a:prstGeom prst="rect">
             <a:avLst/>
@@ -3089,7 +3089,7 @@
           <a:p>
             <a:fld id="{78C97017-6FC3-485B-9764-EAC9E56C1D49}" type="datetimeFigureOut">
               <a:rPr lang="en-US" smtClean="0"/>
-              <a:t>2/6/2017</a:t>
+              <a:t>3/23/2017</a:t>
             </a:fld>
             <a:endParaRPr lang="en-US"/>
           </a:p>
@@ -3107,8 +3107,8 @@
         </p:nvSpPr>
         <p:spPr>
           <a:xfrm>
-            <a:off x="3124200" y="6356350"/>
-            <a:ext cx="2895600" cy="365125"/>
+            <a:off x="4165600" y="6356351"/>
+            <a:ext cx="3860800" cy="365125"/>
           </a:xfrm>
           <a:prstGeom prst="rect">
             <a:avLst/>
@@ -3144,8 +3144,8 @@
         </p:nvSpPr>
         <p:spPr>
           <a:xfrm>
-            <a:off x="6553200" y="6356350"/>
-            <a:ext cx="2133600" cy="365125"/>
+            <a:off x="8737600" y="6356351"/>
+            <a:ext cx="2844800" cy="365125"/>
           </a:xfrm>
           <a:prstGeom prst="rect">
             <a:avLst/>
@@ -3472,7 +3472,7 @@
         </p:nvSpPr>
         <p:spPr>
           <a:xfrm>
-            <a:off x="685800" y="1981200"/>
+            <a:off x="2209800" y="1981200"/>
             <a:ext cx="7252956" cy="4000286"/>
           </a:xfrm>
           <a:prstGeom prst="roundRect">
@@ -3510,7 +3510,7 @@
           <a:lstStyle/>
           <a:p>
             <a:r>
-              <a:rPr lang="en-US" sz="1200" b="1" dirty="0" smtClean="0">
+              <a:rPr lang="en-US" sz="1200" b="1" dirty="0">
                 <a:solidFill>
                   <a:srgbClr val="0070C0"/>
                 </a:solidFill>
@@ -3533,7 +3533,7 @@
         </p:nvSpPr>
         <p:spPr>
           <a:xfrm>
-            <a:off x="845045" y="2296546"/>
+            <a:off x="2369046" y="2296546"/>
             <a:ext cx="1455629" cy="346760"/>
           </a:xfrm>
           <a:prstGeom prst="rect">
@@ -3600,7 +3600,7 @@
         </p:nvCxnSpPr>
         <p:spPr>
           <a:xfrm>
-            <a:off x="1572859" y="2660217"/>
+            <a:off x="3096859" y="2660218"/>
             <a:ext cx="0" cy="2597583"/>
           </a:xfrm>
           <a:prstGeom prst="line">
@@ -3637,7 +3637,7 @@
         </p:nvSpPr>
         <p:spPr>
           <a:xfrm>
-            <a:off x="1500851" y="3010911"/>
+            <a:off x="3024851" y="3010912"/>
             <a:ext cx="152400" cy="2780287"/>
           </a:xfrm>
           <a:prstGeom prst="rect">
@@ -3684,7 +3684,7 @@
         </p:nvSpPr>
         <p:spPr>
           <a:xfrm>
-            <a:off x="2809782" y="2300233"/>
+            <a:off x="4333783" y="2300233"/>
             <a:ext cx="1093635" cy="346760"/>
           </a:xfrm>
           <a:prstGeom prst="rect">
@@ -3720,7 +3720,7 @@
           <a:p>
             <a:pPr algn="ctr"/>
             <a:r>
-              <a:rPr lang="en-US" sz="1600" dirty="0" smtClean="0">
+              <a:rPr lang="en-US" sz="1600" dirty="0">
                 <a:solidFill>
                   <a:schemeClr val="bg1"/>
                 </a:solidFill>
@@ -3743,7 +3743,7 @@
         </p:nvCxnSpPr>
         <p:spPr>
           <a:xfrm>
-            <a:off x="3356599" y="2663904"/>
+            <a:off x="4880599" y="2663904"/>
             <a:ext cx="0" cy="1695374"/>
           </a:xfrm>
           <a:prstGeom prst="line">
@@ -3780,7 +3780,7 @@
         </p:nvSpPr>
         <p:spPr>
           <a:xfrm>
-            <a:off x="3284590" y="3122096"/>
+            <a:off x="4808591" y="3122097"/>
             <a:ext cx="174929" cy="1129459"/>
           </a:xfrm>
           <a:prstGeom prst="rect">
@@ -3815,11 +3815,7 @@
           <a:lstStyle/>
           <a:p>
             <a:pPr algn="ctr"/>
-            <a:endParaRPr lang="en-SG" sz="1400">
-              <a:solidFill>
-                <a:schemeClr val="dk1"/>
-              </a:solidFill>
-            </a:endParaRPr>
+            <a:endParaRPr lang="en-SG" sz="1400"/>
           </a:p>
         </p:txBody>
       </p:sp>
@@ -3831,7 +3827,7 @@
         </p:nvSpPr>
         <p:spPr>
           <a:xfrm>
-            <a:off x="6221565" y="3312740"/>
+            <a:off x="7745566" y="3312740"/>
             <a:ext cx="1093635" cy="461538"/>
           </a:xfrm>
           <a:prstGeom prst="rect">
@@ -3867,7 +3863,7 @@
           <a:p>
             <a:pPr algn="ctr"/>
             <a:r>
-              <a:rPr lang="en-US" sz="1600" dirty="0" smtClean="0">
+              <a:rPr lang="en-US" sz="1600" dirty="0">
                 <a:solidFill>
                   <a:schemeClr val="bg1"/>
                 </a:solidFill>
@@ -3915,7 +3911,7 @@
         </p:nvCxnSpPr>
         <p:spPr>
           <a:xfrm>
-            <a:off x="6772574" y="3774278"/>
+            <a:off x="8296574" y="3774278"/>
             <a:ext cx="0" cy="1940722"/>
           </a:xfrm>
           <a:prstGeom prst="line">
@@ -3952,7 +3948,7 @@
         </p:nvSpPr>
         <p:spPr>
           <a:xfrm>
-            <a:off x="6696374" y="3774278"/>
+            <a:off x="8220374" y="3774279"/>
             <a:ext cx="152400" cy="276003"/>
           </a:xfrm>
           <a:prstGeom prst="rect">
@@ -3999,7 +3995,7 @@
         </p:nvCxnSpPr>
         <p:spPr>
           <a:xfrm>
-            <a:off x="381000" y="3014599"/>
+            <a:off x="1905001" y="3014599"/>
             <a:ext cx="1119851" cy="0"/>
           </a:xfrm>
           <a:prstGeom prst="straightConnector1">
@@ -4035,7 +4031,7 @@
         </p:nvCxnSpPr>
         <p:spPr>
           <a:xfrm flipV="1">
-            <a:off x="1653251" y="3122097"/>
+            <a:off x="3177251" y="3122098"/>
             <a:ext cx="1596514" cy="1"/>
           </a:xfrm>
           <a:prstGeom prst="straightConnector1">
@@ -4071,7 +4067,7 @@
         </p:nvSpPr>
         <p:spPr>
           <a:xfrm>
-            <a:off x="0" y="2743200"/>
+            <a:off x="1524000" y="2743200"/>
             <a:ext cx="1424846" cy="215444"/>
           </a:xfrm>
           <a:prstGeom prst="rect">
@@ -4087,7 +4083,7 @@
           <a:p>
             <a:pPr algn="r"/>
             <a:r>
-              <a:rPr lang="en-US" sz="1400" dirty="0" smtClean="0">
+              <a:rPr lang="en-US" sz="1400" dirty="0">
                 <a:solidFill>
                   <a:srgbClr val="0070C0"/>
                 </a:solidFill>
@@ -4110,7 +4106,7 @@
         </p:nvCxnSpPr>
         <p:spPr>
           <a:xfrm flipV="1">
-            <a:off x="5257218" y="3703214"/>
+            <a:off x="6781218" y="3703215"/>
             <a:ext cx="922392" cy="1"/>
           </a:xfrm>
           <a:prstGeom prst="straightConnector1">
@@ -4146,7 +4142,7 @@
         </p:nvSpPr>
         <p:spPr>
           <a:xfrm>
-            <a:off x="4257582" y="4251556"/>
+            <a:off x="5781583" y="4251556"/>
             <a:ext cx="855809" cy="215444"/>
           </a:xfrm>
           <a:prstGeom prst="rect">
@@ -4186,7 +4182,7 @@
         </p:nvCxnSpPr>
         <p:spPr>
           <a:xfrm>
-            <a:off x="5257800" y="4050281"/>
+            <a:off x="6781800" y="4050281"/>
             <a:ext cx="1492974" cy="0"/>
           </a:xfrm>
           <a:prstGeom prst="straightConnector1">
@@ -4224,7 +4220,7 @@
         </p:nvCxnSpPr>
         <p:spPr>
           <a:xfrm flipV="1">
-            <a:off x="1670186" y="4243231"/>
+            <a:off x="3194186" y="4243231"/>
             <a:ext cx="1596514" cy="5378"/>
           </a:xfrm>
           <a:prstGeom prst="straightConnector1">
@@ -4262,7 +4258,7 @@
         </p:nvCxnSpPr>
         <p:spPr>
           <a:xfrm>
-            <a:off x="304800" y="5791200"/>
+            <a:off x="1828801" y="5791200"/>
             <a:ext cx="1196051" cy="0"/>
           </a:xfrm>
           <a:prstGeom prst="straightConnector1">
@@ -4300,7 +4296,7 @@
         </p:nvSpPr>
         <p:spPr>
           <a:xfrm>
-            <a:off x="8265896" y="2362200"/>
+            <a:off x="9789896" y="2362200"/>
             <a:ext cx="1030504" cy="346760"/>
           </a:xfrm>
           <a:prstGeom prst="rect">
@@ -4365,7 +4361,7 @@
         </p:nvCxnSpPr>
         <p:spPr>
           <a:xfrm>
-            <a:off x="1653251" y="4495317"/>
+            <a:off x="3177252" y="4495317"/>
             <a:ext cx="5043123" cy="0"/>
           </a:xfrm>
           <a:prstGeom prst="straightConnector1">
@@ -4401,7 +4397,7 @@
         </p:nvSpPr>
         <p:spPr>
           <a:xfrm>
-            <a:off x="6687452" y="4467000"/>
+            <a:off x="8211452" y="4467000"/>
             <a:ext cx="161322" cy="1019400"/>
           </a:xfrm>
           <a:prstGeom prst="rect">
@@ -4448,7 +4444,7 @@
         </p:nvCxnSpPr>
         <p:spPr>
           <a:xfrm>
-            <a:off x="8781148" y="2700858"/>
+            <a:off x="10305148" y="2700858"/>
             <a:ext cx="0" cy="2830598"/>
           </a:xfrm>
           <a:prstGeom prst="line">
@@ -4488,7 +4484,7 @@
         </p:nvSpPr>
         <p:spPr>
           <a:xfrm>
-            <a:off x="8686800" y="4524597"/>
+            <a:off x="10210800" y="4524598"/>
             <a:ext cx="152400" cy="199803"/>
           </a:xfrm>
           <a:prstGeom prst="rect">
@@ -4529,11 +4525,7 @@
           <a:lstStyle/>
           <a:p>
             <a:pPr algn="ctr"/>
-            <a:endParaRPr lang="en-SG" sz="1400">
-              <a:solidFill>
-                <a:schemeClr val="dk1"/>
-              </a:solidFill>
-            </a:endParaRPr>
+            <a:endParaRPr lang="en-SG" sz="1400"/>
           </a:p>
         </p:txBody>
       </p:sp>
@@ -4545,7 +4537,7 @@
         </p:nvCxnSpPr>
         <p:spPr>
           <a:xfrm>
-            <a:off x="6850663" y="4524597"/>
+            <a:off x="8374664" y="4524597"/>
             <a:ext cx="1836137" cy="0"/>
           </a:xfrm>
           <a:prstGeom prst="straightConnector1">
@@ -4581,7 +4573,7 @@
         </p:nvCxnSpPr>
         <p:spPr>
           <a:xfrm flipV="1">
-            <a:off x="6848774" y="4714650"/>
+            <a:off x="8372774" y="4714650"/>
             <a:ext cx="1838026" cy="9750"/>
           </a:xfrm>
           <a:prstGeom prst="straightConnector1">
@@ -4622,7 +4614,7 @@
         </p:nvCxnSpPr>
         <p:spPr>
           <a:xfrm>
-            <a:off x="1653251" y="5486400"/>
+            <a:off x="3177252" y="5486400"/>
             <a:ext cx="5052349" cy="0"/>
           </a:xfrm>
           <a:prstGeom prst="straightConnector1">
@@ -4660,7 +4652,7 @@
         </p:nvSpPr>
         <p:spPr>
           <a:xfrm>
-            <a:off x="6984957" y="4267200"/>
+            <a:off x="8508957" y="4267200"/>
             <a:ext cx="1424846" cy="215444"/>
           </a:xfrm>
           <a:prstGeom prst="rect">
@@ -4686,20 +4678,20 @@
           </a:lstStyle>
           <a:p>
             <a:r>
-              <a:rPr lang="en-US" dirty="0" err="1" smtClean="0">
+              <a:rPr lang="en-US">
                 <a:solidFill>
                   <a:srgbClr val="7030A0"/>
                 </a:solidFill>
               </a:rPr>
-              <a:t>deletePerson</a:t>
-            </a:r>
-            <a:r>
-              <a:rPr lang="en-US" dirty="0" smtClean="0">
+              <a:t>deleteTask(p</a:t>
+            </a:r>
+            <a:r>
+              <a:rPr lang="en-US" dirty="0">
                 <a:solidFill>
                   <a:srgbClr val="7030A0"/>
                 </a:solidFill>
               </a:rPr>
-              <a:t>(p)</a:t>
+              <a:t>)</a:t>
             </a:r>
             <a:endParaRPr lang="en-US" dirty="0">
               <a:solidFill>
@@ -4717,7 +4709,7 @@
         </p:nvSpPr>
         <p:spPr>
           <a:xfrm>
-            <a:off x="3847551" y="3657600"/>
+            <a:off x="5371552" y="3657600"/>
             <a:ext cx="767033" cy="184666"/>
           </a:xfrm>
           <a:prstGeom prst="rect">
@@ -4747,7 +4739,7 @@
               <a:t>p</a:t>
             </a:r>
             <a:r>
-              <a:rPr lang="en-US" sz="1200" dirty="0" smtClean="0"/>
+              <a:rPr lang="en-US" sz="1200" dirty="0"/>
               <a:t>arse(“1”)</a:t>
             </a:r>
             <a:endParaRPr lang="en-US" sz="1200" dirty="0"/>
@@ -4762,7 +4754,7 @@
         </p:nvSpPr>
         <p:spPr>
           <a:xfrm>
-            <a:off x="1742982" y="2850922"/>
+            <a:off x="3266982" y="2850922"/>
             <a:ext cx="1424846" cy="215444"/>
           </a:xfrm>
           <a:prstGeom prst="rect">
@@ -4788,7 +4780,7 @@
           </a:lstStyle>
           <a:p>
             <a:r>
-              <a:rPr lang="en-US" dirty="0" smtClean="0"/>
+              <a:rPr lang="en-US" dirty="0"/>
               <a:t>parse(“delete 1”)</a:t>
             </a:r>
             <a:endParaRPr lang="en-US" dirty="0"/>
@@ -4803,7 +4795,7 @@
         </p:nvSpPr>
         <p:spPr>
           <a:xfrm>
-            <a:off x="4340137" y="5255323"/>
+            <a:off x="5864137" y="5255323"/>
             <a:ext cx="621216" cy="215444"/>
           </a:xfrm>
           <a:prstGeom prst="rect">
@@ -4829,7 +4821,7 @@
           </a:lstStyle>
           <a:p>
             <a:r>
-              <a:rPr lang="en-US" dirty="0" smtClean="0"/>
+              <a:rPr lang="en-US" dirty="0"/>
               <a:t>result</a:t>
             </a:r>
             <a:endParaRPr lang="en-US" dirty="0"/>
@@ -4844,7 +4836,7 @@
         </p:nvSpPr>
         <p:spPr>
           <a:xfrm>
-            <a:off x="599983" y="5538488"/>
+            <a:off x="2123983" y="5538488"/>
             <a:ext cx="762000" cy="215444"/>
           </a:xfrm>
           <a:prstGeom prst="rect">
@@ -4870,7 +4862,7 @@
           </a:lstStyle>
           <a:p>
             <a:r>
-              <a:rPr lang="en-US" dirty="0" smtClean="0"/>
+              <a:rPr lang="en-US" dirty="0"/>
               <a:t>result</a:t>
             </a:r>
             <a:endParaRPr lang="en-US" dirty="0"/>
@@ -4885,7 +4877,7 @@
         </p:nvSpPr>
         <p:spPr>
           <a:xfrm>
-            <a:off x="7020246" y="4777286"/>
+            <a:off x="8544246" y="4777286"/>
             <a:ext cx="1590354" cy="461538"/>
           </a:xfrm>
           <a:prstGeom prst="rect">
@@ -4921,7 +4913,7 @@
           <a:p>
             <a:pPr algn="ctr"/>
             <a:r>
-              <a:rPr lang="en-US" sz="1600" dirty="0" err="1" smtClean="0">
+              <a:rPr lang="en-US" sz="1600" dirty="0" err="1">
                 <a:solidFill>
                   <a:schemeClr val="bg1"/>
                 </a:solidFill>
@@ -4929,7 +4921,7 @@
               <a:t>result:Command</a:t>
             </a:r>
             <a:r>
-              <a:rPr lang="en-US" sz="1600" dirty="0" smtClean="0">
+              <a:rPr lang="en-US" sz="1600" dirty="0">
                 <a:solidFill>
                   <a:schemeClr val="bg1"/>
                 </a:solidFill>
@@ -4952,7 +4944,7 @@
         </p:nvSpPr>
         <p:spPr>
           <a:xfrm>
-            <a:off x="7777323" y="5238824"/>
+            <a:off x="9301323" y="5238824"/>
             <a:ext cx="152400" cy="171376"/>
           </a:xfrm>
           <a:prstGeom prst="rect">
@@ -4999,7 +4991,7 @@
         </p:nvCxnSpPr>
         <p:spPr>
           <a:xfrm>
-            <a:off x="6858000" y="5410200"/>
+            <a:off x="8382000" y="5410200"/>
             <a:ext cx="966624" cy="0"/>
           </a:xfrm>
           <a:prstGeom prst="straightConnector1">
@@ -5037,7 +5029,7 @@
         </p:nvSpPr>
         <p:spPr>
           <a:xfrm>
-            <a:off x="2673845" y="4027787"/>
+            <a:off x="4197846" y="4027787"/>
             <a:ext cx="220343" cy="215444"/>
           </a:xfrm>
           <a:prstGeom prst="rect">
@@ -5063,7 +5055,7 @@
           </a:lstStyle>
           <a:p>
             <a:r>
-              <a:rPr lang="en-US" dirty="0" smtClean="0"/>
+              <a:rPr lang="en-US" dirty="0"/>
               <a:t>d</a:t>
             </a:r>
             <a:endParaRPr lang="en-US" dirty="0"/>
@@ -5078,7 +5070,7 @@
         </p:nvSpPr>
         <p:spPr>
           <a:xfrm>
-            <a:off x="4231981" y="2929839"/>
+            <a:off x="5755982" y="2929840"/>
             <a:ext cx="1778201" cy="432035"/>
           </a:xfrm>
           <a:prstGeom prst="rect">
@@ -5114,7 +5106,7 @@
           <a:p>
             <a:pPr algn="ctr"/>
             <a:r>
-              <a:rPr lang="en-US" sz="1600" dirty="0" smtClean="0">
+              <a:rPr lang="en-US" sz="1600" dirty="0">
                 <a:solidFill>
                   <a:schemeClr val="bg1"/>
                 </a:solidFill>
@@ -5122,14 +5114,14 @@
               <a:t>:</a:t>
             </a:r>
             <a:r>
-              <a:rPr lang="en-US" sz="1600" dirty="0" err="1" smtClean="0">
+              <a:rPr lang="en-US" sz="1600" dirty="0" err="1">
                 <a:solidFill>
                   <a:schemeClr val="bg1"/>
                 </a:solidFill>
               </a:rPr>
               <a:t>DeleteCommand</a:t>
             </a:r>
-            <a:endParaRPr lang="en-US" sz="1600" dirty="0" smtClean="0">
+            <a:endParaRPr lang="en-US" sz="1600" dirty="0">
               <a:solidFill>
                 <a:schemeClr val="bg1"/>
               </a:solidFill>
@@ -5138,7 +5130,7 @@
           <a:p>
             <a:pPr algn="ctr"/>
             <a:r>
-              <a:rPr lang="en-US" sz="1600" dirty="0" smtClean="0">
+              <a:rPr lang="en-US" sz="1600" dirty="0">
                 <a:solidFill>
                   <a:schemeClr val="bg1"/>
                 </a:solidFill>
@@ -5161,7 +5153,7 @@
         </p:nvCxnSpPr>
         <p:spPr>
           <a:xfrm>
-            <a:off x="3462591" y="3657600"/>
+            <a:off x="4986591" y="3657601"/>
             <a:ext cx="1597356" cy="1"/>
           </a:xfrm>
           <a:prstGeom prst="straightConnector1">
@@ -5195,7 +5187,7 @@
         </p:nvSpPr>
         <p:spPr>
           <a:xfrm>
-            <a:off x="5059947" y="3352800"/>
+            <a:off x="6583948" y="3352801"/>
             <a:ext cx="205843" cy="123165"/>
           </a:xfrm>
           <a:prstGeom prst="rect">
@@ -5244,7 +5236,7 @@
         </p:nvCxnSpPr>
         <p:spPr>
           <a:xfrm>
-            <a:off x="5162869" y="3352800"/>
+            <a:off x="6686869" y="3352800"/>
             <a:ext cx="0" cy="990600"/>
           </a:xfrm>
           <a:prstGeom prst="line">
@@ -5281,7 +5273,7 @@
         </p:nvSpPr>
         <p:spPr>
           <a:xfrm>
-            <a:off x="5059947" y="3657601"/>
+            <a:off x="6583948" y="3657601"/>
             <a:ext cx="205843" cy="533400"/>
           </a:xfrm>
           <a:prstGeom prst="rect">
@@ -5328,7 +5320,7 @@
         </p:nvCxnSpPr>
         <p:spPr>
           <a:xfrm>
-            <a:off x="3499382" y="4185073"/>
+            <a:off x="5023383" y="4185073"/>
             <a:ext cx="1667219" cy="0"/>
           </a:xfrm>
           <a:prstGeom prst="straightConnector1">
@@ -5366,7 +5358,7 @@
         </p:nvCxnSpPr>
         <p:spPr>
           <a:xfrm>
-            <a:off x="6858000" y="5029200"/>
+            <a:off x="8382000" y="5029200"/>
             <a:ext cx="162246" cy="0"/>
           </a:xfrm>
           <a:prstGeom prst="straightConnector1">
@@ -5400,7 +5392,7 @@
         </p:nvCxnSpPr>
         <p:spPr>
           <a:xfrm>
-            <a:off x="3412425" y="3173004"/>
+            <a:off x="4936425" y="3173005"/>
             <a:ext cx="819556" cy="1"/>
           </a:xfrm>
           <a:prstGeom prst="straightConnector1">
@@ -5436,7 +5428,7 @@
         </p:nvCxnSpPr>
         <p:spPr>
           <a:xfrm>
-            <a:off x="3459519" y="3475965"/>
+            <a:off x="4983519" y="3475965"/>
             <a:ext cx="1600428" cy="0"/>
           </a:xfrm>
           <a:prstGeom prst="straightConnector1">
@@ -5474,7 +5466,7 @@
         </p:nvSpPr>
         <p:spPr>
           <a:xfrm>
-            <a:off x="5033665" y="4199590"/>
+            <a:off x="6557665" y="4199590"/>
             <a:ext cx="258404" cy="261610"/>
           </a:xfrm>
           <a:prstGeom prst="rect">
@@ -5489,7 +5481,7 @@
           <a:lstStyle/>
           <a:p>
             <a:r>
-              <a:rPr lang="en-SG" sz="1100" dirty="0" smtClean="0">
+              <a:rPr lang="en-SG" sz="1100" dirty="0">
                 <a:solidFill>
                   <a:srgbClr val="002060"/>
                 </a:solidFill>

</xml_diff>

<commit_message>
Update deletePerson to deleteTask in sequence diagram
</commit_message>
<xml_diff>
--- a/docs/diagrams/LogicComponentSequenceDiagram.pptx
+++ b/docs/diagrams/LogicComponentSequenceDiagram.pptx
@@ -208,7 +208,7 @@
           <a:p>
             <a:fld id="{F5CC4B3F-88C1-4FFA-B1B6-F41C21DC6924}" type="datetimeFigureOut">
               <a:rPr lang="en-US" smtClean="0"/>
-              <a:t>2/6/2017</a:t>
+              <a:t>3/24/17</a:t>
             </a:fld>
             <a:endParaRPr lang="en-US"/>
           </a:p>
@@ -657,7 +657,7 @@
           <a:p>
             <a:fld id="{78C97017-6FC3-485B-9764-EAC9E56C1D49}" type="datetimeFigureOut">
               <a:rPr lang="en-US" smtClean="0"/>
-              <a:t>2/6/2017</a:t>
+              <a:t>3/24/17</a:t>
             </a:fld>
             <a:endParaRPr lang="en-US"/>
           </a:p>
@@ -827,7 +827,7 @@
           <a:p>
             <a:fld id="{78C97017-6FC3-485B-9764-EAC9E56C1D49}" type="datetimeFigureOut">
               <a:rPr lang="en-US" smtClean="0"/>
-              <a:t>2/6/2017</a:t>
+              <a:t>3/24/17</a:t>
             </a:fld>
             <a:endParaRPr lang="en-US"/>
           </a:p>
@@ -1007,7 +1007,7 @@
           <a:p>
             <a:fld id="{78C97017-6FC3-485B-9764-EAC9E56C1D49}" type="datetimeFigureOut">
               <a:rPr lang="en-US" smtClean="0"/>
-              <a:t>2/6/2017</a:t>
+              <a:t>3/24/17</a:t>
             </a:fld>
             <a:endParaRPr lang="en-US"/>
           </a:p>
@@ -1177,7 +1177,7 @@
           <a:p>
             <a:fld id="{78C97017-6FC3-485B-9764-EAC9E56C1D49}" type="datetimeFigureOut">
               <a:rPr lang="en-US" smtClean="0"/>
-              <a:t>2/6/2017</a:t>
+              <a:t>3/24/17</a:t>
             </a:fld>
             <a:endParaRPr lang="en-US"/>
           </a:p>
@@ -1423,7 +1423,7 @@
           <a:p>
             <a:fld id="{78C97017-6FC3-485B-9764-EAC9E56C1D49}" type="datetimeFigureOut">
               <a:rPr lang="en-US" smtClean="0"/>
-              <a:t>2/6/2017</a:t>
+              <a:t>3/24/17</a:t>
             </a:fld>
             <a:endParaRPr lang="en-US"/>
           </a:p>
@@ -1711,7 +1711,7 @@
           <a:p>
             <a:fld id="{78C97017-6FC3-485B-9764-EAC9E56C1D49}" type="datetimeFigureOut">
               <a:rPr lang="en-US" smtClean="0"/>
-              <a:t>2/6/2017</a:t>
+              <a:t>3/24/17</a:t>
             </a:fld>
             <a:endParaRPr lang="en-US"/>
           </a:p>
@@ -2133,7 +2133,7 @@
           <a:p>
             <a:fld id="{78C97017-6FC3-485B-9764-EAC9E56C1D49}" type="datetimeFigureOut">
               <a:rPr lang="en-US" smtClean="0"/>
-              <a:t>2/6/2017</a:t>
+              <a:t>3/24/17</a:t>
             </a:fld>
             <a:endParaRPr lang="en-US"/>
           </a:p>
@@ -2251,7 +2251,7 @@
           <a:p>
             <a:fld id="{78C97017-6FC3-485B-9764-EAC9E56C1D49}" type="datetimeFigureOut">
               <a:rPr lang="en-US" smtClean="0"/>
-              <a:t>2/6/2017</a:t>
+              <a:t>3/24/17</a:t>
             </a:fld>
             <a:endParaRPr lang="en-US"/>
           </a:p>
@@ -2346,7 +2346,7 @@
           <a:p>
             <a:fld id="{78C97017-6FC3-485B-9764-EAC9E56C1D49}" type="datetimeFigureOut">
               <a:rPr lang="en-US" smtClean="0"/>
-              <a:t>2/6/2017</a:t>
+              <a:t>3/24/17</a:t>
             </a:fld>
             <a:endParaRPr lang="en-US"/>
           </a:p>
@@ -2623,7 +2623,7 @@
           <a:p>
             <a:fld id="{78C97017-6FC3-485B-9764-EAC9E56C1D49}" type="datetimeFigureOut">
               <a:rPr lang="en-US" smtClean="0"/>
-              <a:t>2/6/2017</a:t>
+              <a:t>3/24/17</a:t>
             </a:fld>
             <a:endParaRPr lang="en-US"/>
           </a:p>
@@ -2876,7 +2876,7 @@
           <a:p>
             <a:fld id="{78C97017-6FC3-485B-9764-EAC9E56C1D49}" type="datetimeFigureOut">
               <a:rPr lang="en-US" smtClean="0"/>
-              <a:t>2/6/2017</a:t>
+              <a:t>3/24/17</a:t>
             </a:fld>
             <a:endParaRPr lang="en-US"/>
           </a:p>
@@ -3089,7 +3089,7 @@
           <a:p>
             <a:fld id="{78C97017-6FC3-485B-9764-EAC9E56C1D49}" type="datetimeFigureOut">
               <a:rPr lang="en-US" smtClean="0"/>
-              <a:t>2/6/2017</a:t>
+              <a:t>3/24/17</a:t>
             </a:fld>
             <a:endParaRPr lang="en-US"/>
           </a:p>
@@ -4072,7 +4072,7 @@
         <p:spPr>
           <a:xfrm>
             <a:off x="0" y="2743200"/>
-            <a:ext cx="1424846" cy="215444"/>
+            <a:ext cx="1424846" cy="184666"/>
           </a:xfrm>
           <a:prstGeom prst="rect">
             <a:avLst/>
@@ -4087,14 +4087,14 @@
           <a:p>
             <a:pPr algn="r"/>
             <a:r>
-              <a:rPr lang="en-US" sz="1400" dirty="0" smtClean="0">
+              <a:rPr lang="en-US" sz="1200" dirty="0" smtClean="0">
                 <a:solidFill>
                   <a:srgbClr val="0070C0"/>
                 </a:solidFill>
               </a:rPr>
               <a:t>execute(“delete 1”)</a:t>
             </a:r>
-            <a:endParaRPr lang="en-US" sz="1400" dirty="0">
+            <a:endParaRPr lang="en-US" sz="1200" dirty="0">
               <a:solidFill>
                 <a:srgbClr val="0070C0"/>
               </a:solidFill>
@@ -4147,7 +4147,7 @@
         <p:spPr>
           <a:xfrm>
             <a:off x="4257582" y="4251556"/>
-            <a:ext cx="855809" cy="215444"/>
+            <a:ext cx="855809" cy="184666"/>
           </a:xfrm>
           <a:prstGeom prst="rect">
             <a:avLst/>
@@ -4172,7 +4172,7 @@
           </a:lstStyle>
           <a:p>
             <a:r>
-              <a:rPr lang="en-US" dirty="0"/>
+              <a:rPr lang="en-US" sz="1200" dirty="0"/>
               <a:t>execute()</a:t>
             </a:r>
           </a:p>
@@ -4661,7 +4661,7 @@
         <p:spPr>
           <a:xfrm>
             <a:off x="6984957" y="4267200"/>
-            <a:ext cx="1424846" cy="215444"/>
+            <a:ext cx="1424846" cy="184666"/>
           </a:xfrm>
           <a:prstGeom prst="rect">
             <a:avLst/>
@@ -4686,22 +4686,30 @@
           </a:lstStyle>
           <a:p>
             <a:r>
-              <a:rPr lang="en-US" dirty="0" err="1" smtClean="0">
+              <a:rPr lang="en-US" sz="1200" dirty="0" err="1" smtClean="0">
                 <a:solidFill>
                   <a:srgbClr val="7030A0"/>
                 </a:solidFill>
               </a:rPr>
-              <a:t>deletePerson</a:t>
-            </a:r>
-            <a:r>
-              <a:rPr lang="en-US" dirty="0" smtClean="0">
+              <a:t>deleteTask</a:t>
+            </a:r>
+            <a:r>
+              <a:rPr lang="en-US" sz="1200" dirty="0" smtClean="0">
                 <a:solidFill>
                   <a:srgbClr val="7030A0"/>
                 </a:solidFill>
               </a:rPr>
-              <a:t>(p)</a:t>
-            </a:r>
-            <a:endParaRPr lang="en-US" dirty="0">
+              <a:t>(p</a:t>
+            </a:r>
+            <a:r>
+              <a:rPr lang="en-US" sz="1200" dirty="0" smtClean="0">
+                <a:solidFill>
+                  <a:srgbClr val="7030A0"/>
+                </a:solidFill>
+              </a:rPr>
+              <a:t>)</a:t>
+            </a:r>
+            <a:endParaRPr lang="en-US" sz="1200" dirty="0">
               <a:solidFill>
                 <a:srgbClr val="7030A0"/>
               </a:solidFill>
@@ -4763,7 +4771,7 @@
         <p:spPr>
           <a:xfrm>
             <a:off x="1742982" y="2850922"/>
-            <a:ext cx="1424846" cy="215444"/>
+            <a:ext cx="1424846" cy="184666"/>
           </a:xfrm>
           <a:prstGeom prst="rect">
             <a:avLst/>
@@ -4788,10 +4796,10 @@
           </a:lstStyle>
           <a:p>
             <a:r>
-              <a:rPr lang="en-US" dirty="0" smtClean="0"/>
+              <a:rPr lang="en-US" sz="1200" dirty="0" smtClean="0"/>
               <a:t>parse(“delete 1”)</a:t>
             </a:r>
-            <a:endParaRPr lang="en-US" dirty="0"/>
+            <a:endParaRPr lang="en-US" sz="1200" dirty="0"/>
           </a:p>
         </p:txBody>
       </p:sp>
@@ -4804,7 +4812,7 @@
         <p:spPr>
           <a:xfrm>
             <a:off x="4340137" y="5255323"/>
-            <a:ext cx="621216" cy="215444"/>
+            <a:ext cx="621216" cy="184666"/>
           </a:xfrm>
           <a:prstGeom prst="rect">
             <a:avLst/>
@@ -4829,10 +4837,10 @@
           </a:lstStyle>
           <a:p>
             <a:r>
-              <a:rPr lang="en-US" dirty="0" smtClean="0"/>
+              <a:rPr lang="en-US" sz="1200" dirty="0" smtClean="0"/>
               <a:t>result</a:t>
             </a:r>
-            <a:endParaRPr lang="en-US" dirty="0"/>
+            <a:endParaRPr lang="en-US" sz="1200" dirty="0"/>
           </a:p>
         </p:txBody>
       </p:sp>
@@ -4845,7 +4853,7 @@
         <p:spPr>
           <a:xfrm>
             <a:off x="599983" y="5538488"/>
-            <a:ext cx="762000" cy="215444"/>
+            <a:ext cx="762000" cy="184666"/>
           </a:xfrm>
           <a:prstGeom prst="rect">
             <a:avLst/>
@@ -4870,10 +4878,10 @@
           </a:lstStyle>
           <a:p>
             <a:r>
-              <a:rPr lang="en-US" dirty="0" smtClean="0"/>
+              <a:rPr lang="en-US" sz="1200" dirty="0" smtClean="0"/>
               <a:t>result</a:t>
             </a:r>
-            <a:endParaRPr lang="en-US" dirty="0"/>
+            <a:endParaRPr lang="en-US" sz="1200" dirty="0"/>
           </a:p>
         </p:txBody>
       </p:sp>

</xml_diff>